<commit_message>
corrección de alguna errata en la presentación
</commit_message>
<xml_diff>
--- a/EDA_presentacion.pptx
+++ b/EDA_presentacion.pptx
@@ -6516,7 +6516,7 @@
                 <a:tab algn="l" pos="0"/>
               </a:tabLst>
             </a:pPr>
-            <a:fld id="{1FF2E08A-6AB3-4809-B920-CE28BACC61EB}" type="slidenum">
+            <a:fld id="{53501CC5-6FBE-4908-B23C-B3DBAFC6DF3F}" type="slidenum">
               <a:rPr b="0" lang="es" sz="1000" spc="-1" strike="noStrike">
                 <a:solidFill>
                   <a:srgbClr val="595959"/>
@@ -6883,7 +6883,7 @@
                 <a:tab algn="l" pos="0"/>
               </a:tabLst>
             </a:pPr>
-            <a:fld id="{CCF0F748-1A89-4F00-BCC4-8CBDBD73D893}" type="slidenum">
+            <a:fld id="{53ED0462-555B-4C7C-983A-AE07B7FED03C}" type="slidenum">
               <a:rPr b="0" lang="es" sz="1000" spc="-1" strike="noStrike">
                 <a:solidFill>
                   <a:srgbClr val="595959"/>
@@ -7475,7 +7475,7 @@
                 <a:tab algn="l" pos="0"/>
               </a:tabLst>
             </a:pPr>
-            <a:fld id="{62212C09-FF9C-41C6-894D-F03B673236FA}" type="slidenum">
+            <a:fld id="{85344912-784C-4294-8837-D86DBAFE7056}" type="slidenum">
               <a:rPr b="0" lang="es" sz="1000" spc="-1" strike="noStrike">
                 <a:solidFill>
                   <a:srgbClr val="595959"/>
@@ -7571,7 +7571,7 @@
                 <a:tab algn="l" pos="0"/>
               </a:tabLst>
             </a:pPr>
-            <a:fld id="{B0DFE8C4-D99F-4CF6-BD25-4DC4D9A40C7C}" type="slidenum">
+            <a:fld id="{C18C6498-0D5E-49D6-9ABE-FE6A69FC1A92}" type="slidenum">
               <a:rPr b="0" lang="es" sz="1000" spc="-1" strike="noStrike">
                 <a:solidFill>
                   <a:srgbClr val="595959"/>
@@ -8224,7 +8224,7 @@
                 <a:latin typeface="Lato"/>
                 <a:ea typeface="Lato"/>
               </a:rPr>
-              <a:t>Nº de días de lluvia en el mes/año</a:t>
+              <a:t>Nº de días de lluvia en el mes</a:t>
             </a:r>
             <a:endParaRPr b="0" lang="es-ES" sz="850" spc="-1" strike="noStrike">
               <a:solidFill>
@@ -8315,7 +8315,7 @@
                 <a:latin typeface="Lato"/>
                 <a:ea typeface="Lato"/>
               </a:rPr>
-              <a:t>Nº de días de nieve en el mes/año</a:t>
+              <a:t>Nº de días de nieve en el mes</a:t>
             </a:r>
             <a:endParaRPr b="0" lang="es-ES" sz="850" spc="-1" strike="noStrike">
               <a:solidFill>
@@ -8495,7 +8495,7 @@
                 <a:latin typeface="Lato"/>
                 <a:ea typeface="Lato"/>
               </a:rPr>
-              <a:t>Nº de días de granizo en el mes/año</a:t>
+              <a:t>Nº de días de granizo en el mes</a:t>
             </a:r>
             <a:endParaRPr b="0" lang="es-ES" sz="850" spc="-1" strike="noStrike">
               <a:solidFill>
@@ -8576,7 +8576,7 @@
                 <a:latin typeface="Lato"/>
                 <a:ea typeface="Lato"/>
               </a:rPr>
-              <a:t>Nº de días de tormenta en el mes/año</a:t>
+              <a:t>Nº de días de tormenta en el mes</a:t>
             </a:r>
             <a:endParaRPr b="0" lang="es-ES" sz="850" spc="-1" strike="noStrike">
               <a:solidFill>
@@ -8821,7 +8821,7 @@
                 <a:latin typeface="Lato"/>
                 <a:ea typeface="Lato"/>
               </a:rPr>
-              <a:t>Nº de días de niebla en el mes/año</a:t>
+              <a:t>Nº de días de niebla en el mes</a:t>
             </a:r>
             <a:endParaRPr b="0" lang="es-ES" sz="850" spc="-1" strike="noStrike">
               <a:solidFill>
@@ -8902,7 +8902,7 @@
                 <a:latin typeface="Lato"/>
                 <a:ea typeface="Lato"/>
               </a:rPr>
-              <a:t>Nº de días despejados en el mes/año</a:t>
+              <a:t>Nº de días despejados en el mes</a:t>
             </a:r>
             <a:endParaRPr b="0" lang="es-ES" sz="850" spc="-1" strike="noStrike">
               <a:solidFill>
@@ -9157,7 +9157,7 @@
                 <a:latin typeface="Lato"/>
                 <a:ea typeface="Lato"/>
               </a:rPr>
-              <a:t>Nº de días nubosos en el mes/año</a:t>
+              <a:t>Nº de días nubosos en el mes</a:t>
             </a:r>
             <a:endParaRPr b="0" lang="es-ES" sz="850" spc="-1" strike="noStrike">
               <a:solidFill>
@@ -9238,7 +9238,7 @@
                 <a:latin typeface="Lato"/>
                 <a:ea typeface="Lato"/>
               </a:rPr>
-              <a:t>Nº de días cubiertos en el mes/año</a:t>
+              <a:t>Nº de días cubiertos en el mes</a:t>
             </a:r>
             <a:endParaRPr b="0" lang="es-ES" sz="850" spc="-1" strike="noStrike">
               <a:solidFill>
@@ -10216,7 +10216,7 @@
                 <a:latin typeface="Lato"/>
                 <a:ea typeface="Lato"/>
               </a:rPr>
-              <a:t>Temperatura media mensual/anual (°C)</a:t>
+              <a:t>Temperatura media mensual (°C)</a:t>
             </a:r>
             <a:endParaRPr b="0" lang="es-ES" sz="850" spc="-1" strike="noStrike">
               <a:solidFill>
@@ -10297,7 +10297,7 @@
                 <a:latin typeface="Lato"/>
                 <a:ea typeface="Lato"/>
               </a:rPr>
-              <a:t>Temperatura media mensual/anual de las máximas (°C)</a:t>
+              <a:t>Temperatura media mensual de las máximas (°C)</a:t>
             </a:r>
             <a:endParaRPr b="0" lang="es-ES" sz="850" spc="-1" strike="noStrike">
               <a:solidFill>
@@ -10461,7 +10461,7 @@
                 <a:latin typeface="Lato"/>
                 <a:ea typeface="Lato"/>
               </a:rPr>
-              <a:t>Temperatura media mensual/anual de las mínimas (°C)</a:t>
+              <a:t>Temperatura media mensual de las mínimas (°C)</a:t>
             </a:r>
             <a:endParaRPr b="0" lang="es-ES" sz="850" spc="-1" strike="noStrike">
               <a:solidFill>
@@ -10542,7 +10542,7 @@
                 <a:latin typeface="Lato"/>
                 <a:ea typeface="Lato"/>
               </a:rPr>
-              <a:t>Temperatura máxima absoluta del mes/año y fecha (°C)</a:t>
+              <a:t>Temperatura máxima absoluta del mes (°C)</a:t>
             </a:r>
             <a:endParaRPr b="0" lang="es-ES" sz="850" spc="-1" strike="noStrike">
               <a:solidFill>
@@ -10797,7 +10797,7 @@
                 <a:latin typeface="Lato"/>
                 <a:ea typeface="Lato"/>
               </a:rPr>
-              <a:t>Temperatura mínima absoluta del mes/año y fecha (°C)</a:t>
+              <a:t>Temperatura mínima absoluta del mes (°C)</a:t>
             </a:r>
             <a:endParaRPr b="0" lang="es-ES" sz="850" spc="-1" strike="noStrike">
               <a:solidFill>
@@ -10878,7 +10878,7 @@
                 <a:latin typeface="Lato"/>
                 <a:ea typeface="Lato"/>
               </a:rPr>
-              <a:t>Temperatura mínima más alta del mes/año (°C)</a:t>
+              <a:t>Temperatura mínima más alta del mes (°C)</a:t>
             </a:r>
             <a:endParaRPr b="0" lang="es-ES" sz="850" spc="-1" strike="noStrike">
               <a:solidFill>
@@ -11123,7 +11123,7 @@
                 <a:latin typeface="Lato"/>
                 <a:ea typeface="Lato"/>
               </a:rPr>
-              <a:t>Temperatura máxima más baja del mes/año (°C)</a:t>
+              <a:t>Temperatura máxima más baja del mes (°C)</a:t>
             </a:r>
             <a:endParaRPr b="0" lang="es-ES" sz="850" spc="-1" strike="noStrike">
               <a:solidFill>
@@ -11204,7 +11204,7 @@
                 <a:latin typeface="Lato"/>
                 <a:ea typeface="Lato"/>
               </a:rPr>
-              <a:t>Nº días mes/año de temperatura máxima mayor o igual que 30°C</a:t>
+              <a:t>Nº días mes de temperatura máxima mayor o igual que 30°C</a:t>
             </a:r>
             <a:endParaRPr b="0" lang="es-ES" sz="850" spc="-1" strike="noStrike">
               <a:solidFill>
@@ -12085,7 +12085,7 @@
                 <a:latin typeface="Lato"/>
                 <a:ea typeface="Lato"/>
               </a:rPr>
-              <a:t>Nº días mes/año de temperatura mínima menor o igual que 0°C</a:t>
+              <a:t>Nº días mes de temperatura mínima menor o igual que 0°C</a:t>
             </a:r>
             <a:endParaRPr b="0" lang="es-ES" sz="850" spc="-1" strike="noStrike">
               <a:solidFill>
@@ -12388,7 +12388,7 @@
                 <a:latin typeface="Lato"/>
                 <a:ea typeface="Lato"/>
               </a:rPr>
-              <a:t>Nº días de velocidad del viento mayor o igual a 55 Km/h en el mes/año</a:t>
+              <a:t>Nº días de velocidad del viento mayor o igual a 55 Km/h en el mes</a:t>
             </a:r>
             <a:endParaRPr b="0" lang="es-ES" sz="850" spc="-1" strike="noStrike">
               <a:solidFill>
@@ -12469,7 +12469,7 @@
                 <a:latin typeface="Lato"/>
                 <a:ea typeface="Lato"/>
               </a:rPr>
-              <a:t>Nº días de velocidad del viento mayor o igual a 91 Km/h en el mes/año</a:t>
+              <a:t>Nº días de velocidad del viento mayor o igual a 91 Km/h en el mes</a:t>
             </a:r>
             <a:endParaRPr b="0" lang="es-ES" sz="850" spc="-1" strike="noStrike">
               <a:solidFill>
@@ -15681,7 +15681,7 @@
                 <a:latin typeface="Lato"/>
                 <a:ea typeface="Lato"/>
               </a:rPr>
-              <a:t>Precipitación total mensual/anual (mm)</a:t>
+              <a:t>Precipitación total mensual (mm)</a:t>
             </a:r>
             <a:endParaRPr b="0" lang="es-ES" sz="850" spc="-1" strike="noStrike">
               <a:solidFill>
@@ -15762,7 +15762,7 @@
                 <a:latin typeface="Lato"/>
                 <a:ea typeface="Lato"/>
               </a:rPr>
-              <a:t>Precipitación máxima diaria del mes/año y fecha (mm)</a:t>
+              <a:t>Precipitación máxima diaria del mes (mm)</a:t>
             </a:r>
             <a:endParaRPr b="0" lang="es-ES" sz="850" spc="-1" strike="noStrike">
               <a:solidFill>
@@ -15926,7 +15926,7 @@
                 <a:latin typeface="Lato"/>
                 <a:ea typeface="Lato"/>
               </a:rPr>
-              <a:t>Nº de días de precipitación apreciable (≥ 0,1 mm) en el mes/año</a:t>
+              <a:t>Nº de días de precipitación apreciable (≥ 0,1 mm) en el mes</a:t>
             </a:r>
             <a:endParaRPr b="0" lang="es-ES" sz="850" spc="-1" strike="noStrike">
               <a:solidFill>
@@ -16017,7 +16017,7 @@
                 <a:latin typeface="Lato"/>
                 <a:ea typeface="Lato"/>
               </a:rPr>
-              <a:t>Nº de días de precipitación mayor o igual que 1mm en el mes/año</a:t>
+              <a:t>Nº de días de precipitación mayor o igual que 1mm en el mes</a:t>
             </a:r>
             <a:endParaRPr b="0" lang="es-ES" sz="850" spc="-1" strike="noStrike">
               <a:solidFill>
@@ -16247,7 +16247,7 @@
                 <a:latin typeface="Lato"/>
                 <a:ea typeface="Lato"/>
               </a:rPr>
-              <a:t>Nº de días de precipitación mayor o igual que 10mm en el mes/año</a:t>
+              <a:t>Nº de días de precipitación mayor o igual que 10mm en el mes</a:t>
             </a:r>
             <a:endParaRPr b="0" lang="es-ES" sz="850" spc="-1" strike="noStrike">
               <a:solidFill>
@@ -16328,7 +16328,7 @@
                 <a:latin typeface="Lato"/>
                 <a:ea typeface="Lato"/>
               </a:rPr>
-              <a:t>Nº de días de precipitación mayor o igual que 30mm en el mes/año</a:t>
+              <a:t>Nº de días de precipitación mayor o igual que 30mm en el mes</a:t>
             </a:r>
             <a:endParaRPr b="0" lang="es-ES" sz="850" spc="-1" strike="noStrike">
               <a:solidFill>

</xml_diff>